<commit_message>
[#9079] Set up Angular 6 project (#9080)
* Set up minimal Angular 6 project

* Migrate static pages, disregard design

* Change minimum browser versions

Minimum versions are taken based on Angular and Bootstrap 4's support.

* Fix tracking website configs

* Use jsonlint-cli to validate json

This frees up our dependency to ESLint which is an overkill if only used for linting JSON.

* Move Java and SCSS space linting to their own lint tools

* Use tslint-config-airbnb

* Remove references to JavaScript and JSP in docs

* Update setup guide

* Sort out TSLint rules and fix violations

* Separate CI test to component tests and E2E tests

Component tests: white-box tests
E2E tests: black-box tests, like how the current browser tests have always been

* Upgrade Selenium to 3.14.0

* Update some IntelliJ-specific values

Ref: https://github.com/xpdavid/teammates/commit/76e59d1a0b7f999407510eda832e171a1749fa58

* Update build instructions

* Add placeholder Selenium test
</commit_message>
<xml_diff>
--- a/docs/images/RolesAndTechnologies.pptx
+++ b/docs/images/RolesAndTechnologies.pptx
@@ -10,7 +10,7 @@
   <p:sldIdLst>
     <p:sldId id="256" r:id="rId2"/>
   </p:sldIdLst>
-  <p:sldSz cx="6480175" cy="2879725"/>
+  <p:sldSz cx="6480175" cy="3240088"/>
   <p:notesSz cx="6858000" cy="9144000"/>
   <p:defaultTextStyle>
     <a:defPPr>
@@ -110,7 +110,7 @@
   <p:extLst>
     <p:ext uri="{EFAFB233-063F-42B5-8137-9DF3F51BA10A}">
       <p15:sldGuideLst xmlns:p15="http://schemas.microsoft.com/office/powerpoint/2012/main">
-        <p15:guide id="1" orient="horz" pos="907" userDrawn="1">
+        <p15:guide id="1" orient="horz" pos="1021" userDrawn="1">
           <p15:clr>
             <a:srgbClr val="A4A3A4"/>
           </p15:clr>
@@ -208,7 +208,7 @@
           <a:p>
             <a:fld id="{EB56B9F1-9881-483D-AC17-B3C6E9A32E68}" type="datetimeFigureOut">
               <a:rPr lang="en-SG" smtClean="0"/>
-              <a:t>18/3/2018</a:t>
+              <a:t>27/8/2018</a:t>
             </a:fld>
             <a:endParaRPr lang="en-SG"/>
           </a:p>
@@ -226,8 +226,8 @@
         </p:nvSpPr>
         <p:spPr>
           <a:xfrm>
-            <a:off x="-428625" y="685800"/>
-            <a:ext cx="7715250" cy="3429000"/>
+            <a:off x="0" y="685800"/>
+            <a:ext cx="6858000" cy="3429000"/>
           </a:xfrm>
           <a:prstGeom prst="rect">
             <a:avLst/>
@@ -505,8 +505,8 @@
         </p:nvSpPr>
         <p:spPr>
           <a:xfrm>
-            <a:off x="-428625" y="685800"/>
-            <a:ext cx="7715250" cy="3429000"/>
+            <a:off x="0" y="685800"/>
+            <a:ext cx="6858000" cy="3429000"/>
           </a:xfrm>
         </p:spPr>
       </p:sp>
@@ -594,8 +594,8 @@
         </p:nvSpPr>
         <p:spPr>
           <a:xfrm>
-            <a:off x="486016" y="894583"/>
-            <a:ext cx="5508149" cy="617276"/>
+            <a:off x="486017" y="1006529"/>
+            <a:ext cx="5508149" cy="694521"/>
           </a:xfrm>
         </p:spPr>
         <p:txBody>
@@ -622,8 +622,8 @@
         </p:nvSpPr>
         <p:spPr>
           <a:xfrm>
-            <a:off x="972030" y="1631848"/>
-            <a:ext cx="4536122" cy="735929"/>
+            <a:off x="972030" y="1836055"/>
+            <a:ext cx="4536122" cy="828022"/>
           </a:xfrm>
         </p:spPr>
         <p:txBody>
@@ -747,7 +747,7 @@
             <a:fld id="{1D8BD707-D9CF-40AE-B4C6-C98DA3205C09}" type="datetimeFigureOut">
               <a:rPr lang="en-US" smtClean="0"/>
               <a:pPr/>
-              <a:t>3/18/2018</a:t>
+              <a:t>8/27/2018</a:t>
             </a:fld>
             <a:endParaRPr lang="en-US"/>
           </a:p>
@@ -914,7 +914,7 @@
             <a:fld id="{1D8BD707-D9CF-40AE-B4C6-C98DA3205C09}" type="datetimeFigureOut">
               <a:rPr lang="en-US" smtClean="0"/>
               <a:pPr/>
-              <a:t>3/18/2018</a:t>
+              <a:t>8/27/2018</a:t>
             </a:fld>
             <a:endParaRPr lang="en-US"/>
           </a:p>
@@ -1000,8 +1000,8 @@
         </p:nvSpPr>
         <p:spPr>
           <a:xfrm>
-            <a:off x="4698134" y="115323"/>
-            <a:ext cx="1458040" cy="2457098"/>
+            <a:off x="4698134" y="129755"/>
+            <a:ext cx="1458040" cy="2764574"/>
           </a:xfrm>
         </p:spPr>
         <p:txBody>
@@ -1028,8 +1028,8 @@
         </p:nvSpPr>
         <p:spPr>
           <a:xfrm>
-            <a:off x="324011" y="115323"/>
-            <a:ext cx="4266116" cy="2457098"/>
+            <a:off x="324011" y="129755"/>
+            <a:ext cx="4266116" cy="2764574"/>
           </a:xfrm>
         </p:spPr>
         <p:txBody>
@@ -1091,7 +1091,7 @@
             <a:fld id="{1D8BD707-D9CF-40AE-B4C6-C98DA3205C09}" type="datetimeFigureOut">
               <a:rPr lang="en-US" smtClean="0"/>
               <a:pPr/>
-              <a:t>3/18/2018</a:t>
+              <a:t>8/27/2018</a:t>
             </a:fld>
             <a:endParaRPr lang="en-US"/>
           </a:p>
@@ -1258,7 +1258,7 @@
             <a:fld id="{1D8BD707-D9CF-40AE-B4C6-C98DA3205C09}" type="datetimeFigureOut">
               <a:rPr lang="en-US" smtClean="0"/>
               <a:pPr/>
-              <a:t>3/18/2018</a:t>
+              <a:t>8/27/2018</a:t>
             </a:fld>
             <a:endParaRPr lang="en-US"/>
           </a:p>
@@ -1344,8 +1344,8 @@
         </p:nvSpPr>
         <p:spPr>
           <a:xfrm>
-            <a:off x="511892" y="1850499"/>
-            <a:ext cx="5508149" cy="571945"/>
+            <a:off x="511893" y="2082068"/>
+            <a:ext cx="5508149" cy="643517"/>
           </a:xfrm>
         </p:spPr>
         <p:txBody>
@@ -1376,8 +1376,8 @@
         </p:nvSpPr>
         <p:spPr>
           <a:xfrm>
-            <a:off x="511892" y="1220554"/>
-            <a:ext cx="5508149" cy="629940"/>
+            <a:off x="511893" y="1373292"/>
+            <a:ext cx="5508149" cy="708770"/>
           </a:xfrm>
         </p:spPr>
         <p:txBody>
@@ -1501,7 +1501,7 @@
             <a:fld id="{1D8BD707-D9CF-40AE-B4C6-C98DA3205C09}" type="datetimeFigureOut">
               <a:rPr lang="en-US" smtClean="0"/>
               <a:pPr/>
-              <a:t>3/18/2018</a:t>
+              <a:t>8/27/2018</a:t>
             </a:fld>
             <a:endParaRPr lang="en-US"/>
           </a:p>
@@ -1610,8 +1610,8 @@
         </p:nvSpPr>
         <p:spPr>
           <a:xfrm>
-            <a:off x="324009" y="671940"/>
-            <a:ext cx="2862078" cy="1900486"/>
+            <a:off x="324009" y="756026"/>
+            <a:ext cx="2862078" cy="2138309"/>
           </a:xfrm>
         </p:spPr>
         <p:txBody>
@@ -1695,8 +1695,8 @@
         </p:nvSpPr>
         <p:spPr>
           <a:xfrm>
-            <a:off x="3294090" y="671940"/>
-            <a:ext cx="2862078" cy="1900486"/>
+            <a:off x="3294090" y="756026"/>
+            <a:ext cx="2862078" cy="2138309"/>
           </a:xfrm>
         </p:spPr>
         <p:txBody>
@@ -1786,7 +1786,7 @@
             <a:fld id="{1D8BD707-D9CF-40AE-B4C6-C98DA3205C09}" type="datetimeFigureOut">
               <a:rPr lang="en-US" smtClean="0"/>
               <a:pPr/>
-              <a:t>3/18/2018</a:t>
+              <a:t>8/27/2018</a:t>
             </a:fld>
             <a:endParaRPr lang="en-US"/>
           </a:p>
@@ -1899,8 +1899,8 @@
         </p:nvSpPr>
         <p:spPr>
           <a:xfrm>
-            <a:off x="324010" y="644611"/>
-            <a:ext cx="2863203" cy="268639"/>
+            <a:off x="324012" y="725278"/>
+            <a:ext cx="2863203" cy="302256"/>
           </a:xfrm>
         </p:spPr>
         <p:txBody>
@@ -1964,8 +1964,8 @@
         </p:nvSpPr>
         <p:spPr>
           <a:xfrm>
-            <a:off x="324010" y="913253"/>
-            <a:ext cx="2863203" cy="1659175"/>
+            <a:off x="324012" y="1027536"/>
+            <a:ext cx="2863203" cy="1866801"/>
           </a:xfrm>
         </p:spPr>
         <p:txBody>
@@ -2049,8 +2049,8 @@
         </p:nvSpPr>
         <p:spPr>
           <a:xfrm>
-            <a:off x="3291844" y="644611"/>
-            <a:ext cx="2864327" cy="268639"/>
+            <a:off x="3291846" y="725278"/>
+            <a:ext cx="2864327" cy="302256"/>
           </a:xfrm>
         </p:spPr>
         <p:txBody>
@@ -2114,8 +2114,8 @@
         </p:nvSpPr>
         <p:spPr>
           <a:xfrm>
-            <a:off x="3291844" y="913253"/>
-            <a:ext cx="2864327" cy="1659175"/>
+            <a:off x="3291846" y="1027536"/>
+            <a:ext cx="2864327" cy="1866801"/>
           </a:xfrm>
         </p:spPr>
         <p:txBody>
@@ -2205,7 +2205,7 @@
             <a:fld id="{1D8BD707-D9CF-40AE-B4C6-C98DA3205C09}" type="datetimeFigureOut">
               <a:rPr lang="en-US" smtClean="0"/>
               <a:pPr/>
-              <a:t>3/18/2018</a:t>
+              <a:t>8/27/2018</a:t>
             </a:fld>
             <a:endParaRPr lang="en-US"/>
           </a:p>
@@ -2320,7 +2320,7 @@
             <a:fld id="{1D8BD707-D9CF-40AE-B4C6-C98DA3205C09}" type="datetimeFigureOut">
               <a:rPr lang="en-US" smtClean="0"/>
               <a:pPr/>
-              <a:t>3/18/2018</a:t>
+              <a:t>8/27/2018</a:t>
             </a:fld>
             <a:endParaRPr lang="en-US"/>
           </a:p>
@@ -2412,7 +2412,7 @@
             <a:fld id="{1D8BD707-D9CF-40AE-B4C6-C98DA3205C09}" type="datetimeFigureOut">
               <a:rPr lang="en-US" smtClean="0"/>
               <a:pPr/>
-              <a:t>3/18/2018</a:t>
+              <a:t>8/27/2018</a:t>
             </a:fld>
             <a:endParaRPr lang="en-US"/>
           </a:p>
@@ -2498,8 +2498,8 @@
         </p:nvSpPr>
         <p:spPr>
           <a:xfrm>
-            <a:off x="324012" y="114660"/>
-            <a:ext cx="2131934" cy="487953"/>
+            <a:off x="324012" y="129009"/>
+            <a:ext cx="2131934" cy="549014"/>
           </a:xfrm>
         </p:spPr>
         <p:txBody>
@@ -2530,8 +2530,8 @@
         </p:nvSpPr>
         <p:spPr>
           <a:xfrm>
-            <a:off x="2533570" y="114662"/>
-            <a:ext cx="3622598" cy="2457765"/>
+            <a:off x="2533570" y="129012"/>
+            <a:ext cx="3622598" cy="2765324"/>
           </a:xfrm>
         </p:spPr>
         <p:txBody>
@@ -2615,8 +2615,8 @@
         </p:nvSpPr>
         <p:spPr>
           <a:xfrm>
-            <a:off x="324012" y="602611"/>
-            <a:ext cx="2131934" cy="1969812"/>
+            <a:off x="324012" y="678021"/>
+            <a:ext cx="2131934" cy="2216310"/>
           </a:xfrm>
         </p:spPr>
         <p:txBody>
@@ -2686,7 +2686,7 @@
             <a:fld id="{1D8BD707-D9CF-40AE-B4C6-C98DA3205C09}" type="datetimeFigureOut">
               <a:rPr lang="en-US" smtClean="0"/>
               <a:pPr/>
-              <a:t>3/18/2018</a:t>
+              <a:t>8/27/2018</a:t>
             </a:fld>
             <a:endParaRPr lang="en-US"/>
           </a:p>
@@ -2772,8 +2772,8 @@
         </p:nvSpPr>
         <p:spPr>
           <a:xfrm>
-            <a:off x="1270163" y="2015816"/>
-            <a:ext cx="3888105" cy="237977"/>
+            <a:off x="1270165" y="2268072"/>
+            <a:ext cx="3888105" cy="267757"/>
           </a:xfrm>
         </p:spPr>
         <p:txBody>
@@ -2804,8 +2804,8 @@
         </p:nvSpPr>
         <p:spPr>
           <a:xfrm>
-            <a:off x="1270163" y="257316"/>
-            <a:ext cx="3888105" cy="1727835"/>
+            <a:off x="1270165" y="289517"/>
+            <a:ext cx="3888105" cy="1944053"/>
           </a:xfrm>
         </p:spPr>
         <p:txBody>
@@ -2865,8 +2865,8 @@
         </p:nvSpPr>
         <p:spPr>
           <a:xfrm>
-            <a:off x="1270163" y="2253787"/>
-            <a:ext cx="3888105" cy="337968"/>
+            <a:off x="1270165" y="2535821"/>
+            <a:ext cx="3888105" cy="380261"/>
           </a:xfrm>
         </p:spPr>
         <p:txBody>
@@ -2936,7 +2936,7 @@
             <a:fld id="{1D8BD707-D9CF-40AE-B4C6-C98DA3205C09}" type="datetimeFigureOut">
               <a:rPr lang="en-US" smtClean="0"/>
               <a:pPr/>
-              <a:t>3/18/2018</a:t>
+              <a:t>8/27/2018</a:t>
             </a:fld>
             <a:endParaRPr lang="en-US"/>
           </a:p>
@@ -3027,8 +3027,8 @@
         </p:nvSpPr>
         <p:spPr>
           <a:xfrm>
-            <a:off x="324014" y="115329"/>
-            <a:ext cx="5832158" cy="479954"/>
+            <a:off x="324014" y="129762"/>
+            <a:ext cx="5832158" cy="540014"/>
           </a:xfrm>
           <a:prstGeom prst="rect">
             <a:avLst/>
@@ -3060,8 +3060,8 @@
         </p:nvSpPr>
         <p:spPr>
           <a:xfrm>
-            <a:off x="324014" y="671940"/>
-            <a:ext cx="5832158" cy="1900486"/>
+            <a:off x="324014" y="756026"/>
+            <a:ext cx="5832158" cy="2138309"/>
           </a:xfrm>
           <a:prstGeom prst="rect">
             <a:avLst/>
@@ -3122,8 +3122,8 @@
         </p:nvSpPr>
         <p:spPr>
           <a:xfrm>
-            <a:off x="324015" y="2669085"/>
-            <a:ext cx="1512041" cy="153319"/>
+            <a:off x="324017" y="3003089"/>
+            <a:ext cx="1512041" cy="172505"/>
           </a:xfrm>
           <a:prstGeom prst="rect">
             <a:avLst/>
@@ -3146,7 +3146,7 @@
             <a:fld id="{1D8BD707-D9CF-40AE-B4C6-C98DA3205C09}" type="datetimeFigureOut">
               <a:rPr lang="en-US" smtClean="0"/>
               <a:pPr/>
-              <a:t>3/18/2018</a:t>
+              <a:t>8/27/2018</a:t>
             </a:fld>
             <a:endParaRPr lang="en-US"/>
           </a:p>
@@ -3164,8 +3164,8 @@
         </p:nvSpPr>
         <p:spPr>
           <a:xfrm>
-            <a:off x="2214063" y="2669085"/>
-            <a:ext cx="2052056" cy="153319"/>
+            <a:off x="2214063" y="3003089"/>
+            <a:ext cx="2052056" cy="172505"/>
           </a:xfrm>
           <a:prstGeom prst="rect">
             <a:avLst/>
@@ -3201,8 +3201,8 @@
         </p:nvSpPr>
         <p:spPr>
           <a:xfrm>
-            <a:off x="4644131" y="2669085"/>
-            <a:ext cx="1512041" cy="153319"/>
+            <a:off x="4644133" y="3003089"/>
+            <a:ext cx="1512041" cy="172505"/>
           </a:xfrm>
           <a:prstGeom prst="rect">
             <a:avLst/>
@@ -3525,8 +3525,8 @@
         </p:nvSpPr>
         <p:spPr>
           <a:xfrm>
-            <a:off x="3926271" y="107260"/>
-            <a:ext cx="1144800" cy="2628000"/>
+            <a:off x="3926271" y="115844"/>
+            <a:ext cx="1144800" cy="2952000"/>
           </a:xfrm>
           <a:prstGeom prst="roundRect">
             <a:avLst>
@@ -3573,8 +3573,8 @@
         </p:nvSpPr>
         <p:spPr>
           <a:xfrm>
-            <a:off x="2668396" y="107260"/>
-            <a:ext cx="1144800" cy="2628000"/>
+            <a:off x="2668396" y="115844"/>
+            <a:ext cx="1144800" cy="2952000"/>
           </a:xfrm>
           <a:prstGeom prst="roundRect">
             <a:avLst>
@@ -3621,8 +3621,8 @@
         </p:nvSpPr>
         <p:spPr>
           <a:xfrm>
-            <a:off x="1410520" y="107260"/>
-            <a:ext cx="1144800" cy="2628000"/>
+            <a:off x="1410520" y="115844"/>
+            <a:ext cx="1144800" cy="2952000"/>
           </a:xfrm>
           <a:prstGeom prst="roundRect">
             <a:avLst>
@@ -3669,8 +3669,8 @@
         </p:nvSpPr>
         <p:spPr>
           <a:xfrm>
-            <a:off x="146698" y="107260"/>
-            <a:ext cx="1144800" cy="2628000"/>
+            <a:off x="146698" y="115844"/>
+            <a:ext cx="1144800" cy="2952000"/>
           </a:xfrm>
           <a:prstGeom prst="roundRect">
             <a:avLst>
@@ -3717,7 +3717,7 @@
         </p:nvSpPr>
         <p:spPr>
           <a:xfrm>
-            <a:off x="1408237" y="684324"/>
+            <a:off x="1408239" y="692910"/>
             <a:ext cx="1147089" cy="777247"/>
           </a:xfrm>
           <a:prstGeom prst="roundRect">
@@ -3751,16 +3751,6 @@
           <a:lstStyle/>
           <a:p>
             <a:pPr algn="ctr"/>
-            <a:r>
-              <a:rPr lang="en-US" sz="1400" b="1" dirty="0" err="1">
-                <a:solidFill>
-                  <a:schemeClr val="bg1"/>
-                </a:solidFill>
-                <a:latin typeface="Consolas" pitchFamily="49" charset="0"/>
-                <a:cs typeface="Consolas" pitchFamily="49" charset="0"/>
-              </a:rPr>
-              <a:t>QUnit</a:t>
-            </a:r>
             <a:endParaRPr lang="en-US" sz="1400" b="1" dirty="0">
               <a:solidFill>
                 <a:schemeClr val="bg1"/>
@@ -3769,46 +3759,6 @@
               <a:cs typeface="Consolas" pitchFamily="49" charset="0"/>
             </a:endParaRPr>
           </a:p>
-          <a:p>
-            <a:pPr algn="ctr"/>
-            <a:r>
-              <a:rPr lang="en-US" sz="1400" b="1" dirty="0" err="1">
-                <a:solidFill>
-                  <a:schemeClr val="bg1"/>
-                </a:solidFill>
-                <a:latin typeface="Consolas" pitchFamily="49" charset="0"/>
-                <a:cs typeface="Consolas" pitchFamily="49" charset="0"/>
-              </a:rPr>
-              <a:t>TestNG</a:t>
-            </a:r>
-            <a:endParaRPr lang="en-US" sz="1400" b="1" dirty="0">
-              <a:solidFill>
-                <a:schemeClr val="bg1"/>
-              </a:solidFill>
-              <a:latin typeface="Consolas" pitchFamily="49" charset="0"/>
-              <a:cs typeface="Consolas" pitchFamily="49" charset="0"/>
-            </a:endParaRPr>
-          </a:p>
-          <a:p>
-            <a:pPr algn="ctr"/>
-            <a:r>
-              <a:rPr lang="en-US" sz="1400" b="1" dirty="0">
-                <a:solidFill>
-                  <a:schemeClr val="bg1"/>
-                </a:solidFill>
-                <a:latin typeface="Consolas" pitchFamily="49" charset="0"/>
-                <a:cs typeface="Consolas" pitchFamily="49" charset="0"/>
-              </a:rPr>
-              <a:t>Selenium</a:t>
-            </a:r>
-            <a:endParaRPr lang="en-SG" sz="1400" b="1" dirty="0">
-              <a:solidFill>
-                <a:schemeClr val="bg1"/>
-              </a:solidFill>
-              <a:latin typeface="Consolas" pitchFamily="49" charset="0"/>
-              <a:cs typeface="Consolas" pitchFamily="49" charset="0"/>
-            </a:endParaRPr>
-          </a:p>
         </p:txBody>
       </p:sp>
       <p:sp>
@@ -3819,7 +3769,7 @@
         </p:nvSpPr>
         <p:spPr>
           <a:xfrm>
-            <a:off x="146169" y="684323"/>
+            <a:off x="146169" y="692909"/>
             <a:ext cx="1145330" cy="1806373"/>
           </a:xfrm>
           <a:prstGeom prst="roundRect">
@@ -3870,7 +3820,7 @@
         </p:nvSpPr>
         <p:spPr>
           <a:xfrm>
-            <a:off x="3927645" y="684318"/>
+            <a:off x="3927645" y="692902"/>
             <a:ext cx="1143426" cy="983486"/>
           </a:xfrm>
           <a:prstGeom prst="roundRect">
@@ -3905,6 +3855,26 @@
           <a:p>
             <a:pPr algn="ctr"/>
             <a:r>
+              <a:rPr lang="en-US" sz="1400" b="1" dirty="0" err="1">
+                <a:solidFill>
+                  <a:schemeClr val="bg1"/>
+                </a:solidFill>
+                <a:latin typeface="Consolas" pitchFamily="49" charset="0"/>
+                <a:cs typeface="Consolas" pitchFamily="49" charset="0"/>
+              </a:rPr>
+              <a:t>Gradle</a:t>
+            </a:r>
+            <a:endParaRPr lang="en-US" sz="1400" b="1" dirty="0">
+              <a:solidFill>
+                <a:schemeClr val="bg1"/>
+              </a:solidFill>
+              <a:latin typeface="Consolas" pitchFamily="49" charset="0"/>
+              <a:cs typeface="Consolas" pitchFamily="49" charset="0"/>
+            </a:endParaRPr>
+          </a:p>
+          <a:p>
+            <a:pPr algn="ctr"/>
+            <a:r>
               <a:rPr lang="en-US" sz="1400" b="1" dirty="0">
                 <a:solidFill>
                   <a:schemeClr val="bg1"/>
@@ -3912,20 +3882,7 @@
                 <a:latin typeface="Consolas" pitchFamily="49" charset="0"/>
                 <a:cs typeface="Consolas" pitchFamily="49" charset="0"/>
               </a:rPr>
-              <a:t>Objectify</a:t>
-            </a:r>
-          </a:p>
-          <a:p>
-            <a:pPr algn="ctr"/>
-            <a:r>
-              <a:rPr lang="en-US" sz="1400" b="1" dirty="0" err="1">
-                <a:solidFill>
-                  <a:schemeClr val="bg1"/>
-                </a:solidFill>
-                <a:latin typeface="Consolas" pitchFamily="49" charset="0"/>
-                <a:cs typeface="Consolas" pitchFamily="49" charset="0"/>
-              </a:rPr>
-              <a:t>Datastore</a:t>
+              <a:t>Node.js</a:t>
             </a:r>
             <a:endParaRPr lang="en-SG" sz="1400" b="1" dirty="0">
               <a:solidFill>
@@ -3945,7 +3902,7 @@
         </p:nvSpPr>
         <p:spPr>
           <a:xfrm>
-            <a:off x="146169" y="107261"/>
+            <a:off x="146169" y="115845"/>
             <a:ext cx="1145330" cy="532710"/>
           </a:xfrm>
           <a:prstGeom prst="rect">
@@ -3978,7 +3935,7 @@
         </p:nvSpPr>
         <p:spPr>
           <a:xfrm>
-            <a:off x="1394865" y="107261"/>
+            <a:off x="1394867" y="115845"/>
             <a:ext cx="1185431" cy="532710"/>
           </a:xfrm>
           <a:prstGeom prst="rect">
@@ -3998,8 +3955,13 @@
                   <a:schemeClr val="bg1"/>
                 </a:solidFill>
               </a:rPr>
-              <a:t>Test developer</a:t>
-            </a:r>
+              <a:t>Front-end developer</a:t>
+            </a:r>
+            <a:endParaRPr lang="en-US" sz="1431" b="1" dirty="0">
+              <a:solidFill>
+                <a:schemeClr val="bg1"/>
+              </a:solidFill>
+            </a:endParaRPr>
           </a:p>
         </p:txBody>
       </p:sp>
@@ -4011,7 +3973,7 @@
         </p:nvSpPr>
         <p:spPr>
           <a:xfrm>
-            <a:off x="2668396" y="106468"/>
+            <a:off x="2668396" y="115052"/>
             <a:ext cx="1144800" cy="532710"/>
           </a:xfrm>
           <a:prstGeom prst="rect">
@@ -4026,21 +3988,18 @@
           <a:p>
             <a:pPr algn="ctr"/>
             <a:r>
-              <a:rPr lang="en-US" sz="1431" b="1" dirty="0" smtClean="0">
-                <a:solidFill>
-                  <a:schemeClr val="bg1"/>
-                </a:solidFill>
-              </a:rPr>
-              <a:t>Front end </a:t>
-            </a:r>
-            <a:r>
               <a:rPr lang="en-US" sz="1431" b="1" dirty="0">
                 <a:solidFill>
                   <a:schemeClr val="bg1"/>
                 </a:solidFill>
               </a:rPr>
-              <a:t>developer</a:t>
-            </a:r>
+              <a:t>Test developer</a:t>
+            </a:r>
+            <a:endParaRPr lang="en-US" sz="1431" b="1" dirty="0">
+              <a:solidFill>
+                <a:schemeClr val="bg1"/>
+              </a:solidFill>
+            </a:endParaRPr>
           </a:p>
         </p:txBody>
       </p:sp>
@@ -4052,7 +4011,7 @@
         </p:nvSpPr>
         <p:spPr>
           <a:xfrm>
-            <a:off x="3926271" y="100767"/>
+            <a:off x="3926271" y="109351"/>
             <a:ext cx="1144800" cy="532710"/>
           </a:xfrm>
           <a:prstGeom prst="rect">
@@ -4071,21 +4030,18 @@
               </a:tabLst>
             </a:pPr>
             <a:r>
-              <a:rPr lang="en-US" sz="1431" b="1" dirty="0" smtClean="0">
-                <a:solidFill>
-                  <a:schemeClr val="bg1"/>
-                </a:solidFill>
-              </a:rPr>
-              <a:t>Back end </a:t>
-            </a:r>
-            <a:r>
               <a:rPr lang="en-US" sz="1431" b="1" dirty="0">
                 <a:solidFill>
                   <a:schemeClr val="bg1"/>
                 </a:solidFill>
               </a:rPr>
-              <a:t>developer</a:t>
-            </a:r>
+              <a:t>DevOps developer</a:t>
+            </a:r>
+            <a:endParaRPr lang="en-US" sz="1431" b="1" dirty="0">
+              <a:solidFill>
+                <a:schemeClr val="bg1"/>
+              </a:solidFill>
+            </a:endParaRPr>
           </a:p>
         </p:txBody>
       </p:sp>
@@ -4097,8 +4053,8 @@
         </p:nvSpPr>
         <p:spPr>
           <a:xfrm>
-            <a:off x="5182822" y="105060"/>
-            <a:ext cx="1144800" cy="2628000"/>
+            <a:off x="5182822" y="113644"/>
+            <a:ext cx="1144800" cy="2952000"/>
           </a:xfrm>
           <a:prstGeom prst="roundRect">
             <a:avLst>
@@ -4145,7 +4101,7 @@
         </p:nvSpPr>
         <p:spPr>
           <a:xfrm>
-            <a:off x="5207795" y="699416"/>
+            <a:off x="5207797" y="708002"/>
             <a:ext cx="1119831" cy="777247"/>
           </a:xfrm>
           <a:prstGeom prst="roundRect">
@@ -4180,6 +4136,19 @@
           <a:p>
             <a:pPr algn="ctr"/>
             <a:r>
+              <a:rPr lang="en-US" sz="1400" b="1" dirty="0">
+                <a:solidFill>
+                  <a:schemeClr val="bg1"/>
+                </a:solidFill>
+                <a:latin typeface="Consolas" pitchFamily="49" charset="0"/>
+                <a:cs typeface="Consolas" pitchFamily="49" charset="0"/>
+              </a:rPr>
+              <a:t>Objectify</a:t>
+            </a:r>
+          </a:p>
+          <a:p>
+            <a:pPr algn="ctr"/>
+            <a:r>
               <a:rPr lang="en-US" sz="1400" b="1" dirty="0" err="1">
                 <a:solidFill>
                   <a:schemeClr val="bg1"/>
@@ -4187,7 +4156,7 @@
                 <a:latin typeface="Consolas" pitchFamily="49" charset="0"/>
                 <a:cs typeface="Consolas" pitchFamily="49" charset="0"/>
               </a:rPr>
-              <a:t>Gradle</a:t>
+              <a:t>Datastore</a:t>
             </a:r>
             <a:endParaRPr lang="en-US" sz="1400" b="1" dirty="0">
               <a:solidFill>
@@ -4197,19 +4166,6 @@
               <a:cs typeface="Consolas" pitchFamily="49" charset="0"/>
             </a:endParaRPr>
           </a:p>
-          <a:p>
-            <a:pPr algn="ctr"/>
-            <a:r>
-              <a:rPr lang="en-US" sz="1400" b="1" dirty="0">
-                <a:solidFill>
-                  <a:schemeClr val="bg1"/>
-                </a:solidFill>
-                <a:latin typeface="Consolas" pitchFamily="49" charset="0"/>
-                <a:cs typeface="Consolas" pitchFamily="49" charset="0"/>
-              </a:rPr>
-              <a:t>Node.js</a:t>
-            </a:r>
-          </a:p>
         </p:txBody>
       </p:sp>
       <p:sp>
@@ -4220,7 +4176,7 @@
         </p:nvSpPr>
         <p:spPr>
           <a:xfrm>
-            <a:off x="5207795" y="115861"/>
+            <a:off x="5207797" y="124445"/>
             <a:ext cx="1119831" cy="532710"/>
           </a:xfrm>
           <a:prstGeom prst="rect">
@@ -4244,8 +4200,13 @@
                   <a:schemeClr val="bg1"/>
                 </a:solidFill>
               </a:rPr>
-              <a:t>DevOps developer</a:t>
-            </a:r>
+              <a:t>Back-end developer</a:t>
+            </a:r>
+            <a:endParaRPr lang="en-US" sz="1431" b="1" dirty="0">
+              <a:solidFill>
+                <a:schemeClr val="bg1"/>
+              </a:solidFill>
+            </a:endParaRPr>
           </a:p>
         </p:txBody>
       </p:sp>
@@ -4257,8 +4218,8 @@
         </p:nvSpPr>
         <p:spPr>
           <a:xfrm>
-            <a:off x="195691" y="1984029"/>
-            <a:ext cx="3566869" cy="321793"/>
+            <a:off x="195691" y="2267008"/>
+            <a:ext cx="2304000" cy="321793"/>
           </a:xfrm>
           <a:prstGeom prst="roundRect">
             <a:avLst>
@@ -4301,7 +4262,7 @@
                 <a:latin typeface="Consolas" pitchFamily="49" charset="0"/>
                 <a:cs typeface="Consolas" pitchFamily="49" charset="0"/>
               </a:rPr>
-              <a:t>HTML, CSS, JavaScript, </a:t>
+              <a:t>HTML, </a:t>
             </a:r>
             <a:r>
               <a:rPr lang="en-SG" sz="1400" b="1" dirty="0">
@@ -4311,7 +4272,27 @@
                 <a:latin typeface="Consolas" pitchFamily="49" charset="0"/>
                 <a:cs typeface="Consolas" pitchFamily="49" charset="0"/>
               </a:rPr>
-              <a:t>JSP</a:t>
+              <a:t>SCSS</a:t>
+            </a:r>
+            <a:r>
+              <a:rPr lang="en-SG" sz="1400" b="1" dirty="0">
+                <a:solidFill>
+                  <a:schemeClr val="tx1"/>
+                </a:solidFill>
+                <a:latin typeface="Consolas" pitchFamily="49" charset="0"/>
+                <a:cs typeface="Consolas" pitchFamily="49" charset="0"/>
+              </a:rPr>
+              <a:t>, </a:t>
+            </a:r>
+            <a:r>
+              <a:rPr lang="en-SG" sz="1400" b="1" dirty="0">
+                <a:solidFill>
+                  <a:schemeClr val="tx1"/>
+                </a:solidFill>
+                <a:latin typeface="Consolas" pitchFamily="49" charset="0"/>
+                <a:cs typeface="Consolas" pitchFamily="49" charset="0"/>
+              </a:rPr>
+              <a:t>Bootstrap</a:t>
             </a:r>
             <a:endParaRPr lang="en-SG" sz="1400" b="1" dirty="0">
               <a:solidFill>
@@ -4331,8 +4312,8 @@
         </p:nvSpPr>
         <p:spPr>
           <a:xfrm>
-            <a:off x="1458877" y="1606864"/>
-            <a:ext cx="4755280" cy="321793"/>
+            <a:off x="2706687" y="1505008"/>
+            <a:ext cx="3581400" cy="321793"/>
           </a:xfrm>
           <a:prstGeom prst="roundRect">
             <a:avLst>
@@ -4375,27 +4356,7 @@
                 <a:latin typeface="Consolas" pitchFamily="49" charset="0"/>
                 <a:cs typeface="Consolas" pitchFamily="49" charset="0"/>
               </a:rPr>
-              <a:t>Java, </a:t>
-            </a:r>
-            <a:r>
-              <a:rPr lang="en-US" sz="1400" b="1" dirty="0">
-                <a:solidFill>
-                  <a:schemeClr val="tx1"/>
-                </a:solidFill>
-                <a:latin typeface="Consolas" pitchFamily="49" charset="0"/>
-                <a:cs typeface="Consolas" pitchFamily="49" charset="0"/>
-              </a:rPr>
-              <a:t>Servlet, </a:t>
-            </a:r>
-            <a:r>
-              <a:rPr lang="en-US" sz="1400" b="1" dirty="0">
-                <a:solidFill>
-                  <a:schemeClr val="tx1"/>
-                </a:solidFill>
-                <a:latin typeface="Consolas" pitchFamily="49" charset="0"/>
-                <a:cs typeface="Consolas" pitchFamily="49" charset="0"/>
-              </a:rPr>
-              <a:t>Google App Engine</a:t>
+              <a:t>Java, Servlet, Google App Engine</a:t>
             </a:r>
             <a:endParaRPr lang="en-SG" sz="1400" b="1" dirty="0">
               <a:solidFill>
@@ -4415,8 +4376,8 @@
         </p:nvSpPr>
         <p:spPr>
           <a:xfrm>
-            <a:off x="201273" y="2359269"/>
-            <a:ext cx="6012884" cy="307444"/>
+            <a:off x="201273" y="2665000"/>
+            <a:ext cx="6086814" cy="307444"/>
           </a:xfrm>
           <a:prstGeom prst="roundRect">
             <a:avLst>
@@ -4479,7 +4440,7 @@
         </p:nvCxnSpPr>
         <p:spPr>
           <a:xfrm>
-            <a:off x="39687" y="661259"/>
+            <a:off x="39687" y="669843"/>
             <a:ext cx="6372000" cy="0"/>
           </a:xfrm>
           <a:prstGeom prst="line">
@@ -4515,7 +4476,7 @@
         </p:nvSpPr>
         <p:spPr>
           <a:xfrm>
-            <a:off x="2674341" y="684324"/>
+            <a:off x="2674341" y="692910"/>
             <a:ext cx="1123844" cy="777247"/>
           </a:xfrm>
           <a:prstGeom prst="roundRect">
@@ -4550,6 +4511,26 @@
           <a:p>
             <a:pPr algn="ctr"/>
             <a:r>
+              <a:rPr lang="en-US" sz="1400" b="1" dirty="0" err="1">
+                <a:solidFill>
+                  <a:schemeClr val="bg1"/>
+                </a:solidFill>
+                <a:latin typeface="Consolas" pitchFamily="49" charset="0"/>
+                <a:cs typeface="Consolas" pitchFamily="49" charset="0"/>
+              </a:rPr>
+              <a:t>TestNG</a:t>
+            </a:r>
+            <a:endParaRPr lang="en-US" sz="1400" b="1" dirty="0">
+              <a:solidFill>
+                <a:schemeClr val="bg1"/>
+              </a:solidFill>
+              <a:latin typeface="Consolas" pitchFamily="49" charset="0"/>
+              <a:cs typeface="Consolas" pitchFamily="49" charset="0"/>
+            </a:endParaRPr>
+          </a:p>
+          <a:p>
+            <a:pPr algn="ctr"/>
+            <a:r>
               <a:rPr lang="en-US" sz="1400" b="1" dirty="0">
                 <a:solidFill>
                   <a:schemeClr val="bg1"/>
@@ -4557,7 +4538,7 @@
                 <a:latin typeface="Consolas" pitchFamily="49" charset="0"/>
                 <a:cs typeface="Consolas" pitchFamily="49" charset="0"/>
               </a:rPr>
-              <a:t>jQuery</a:t>
+              <a:t>Selenium</a:t>
             </a:r>
           </a:p>
           <a:p>
@@ -4570,11 +4551,78 @@
                 <a:latin typeface="Consolas" pitchFamily="49" charset="0"/>
                 <a:cs typeface="Consolas" pitchFamily="49" charset="0"/>
               </a:rPr>
-              <a:t>Bootstrap</a:t>
+              <a:t>Jasmine</a:t>
+            </a:r>
+          </a:p>
+        </p:txBody>
+      </p:sp>
+      <p:sp>
+        <p:nvSpPr>
+          <p:cNvPr id="27" name="Rounded Rectangle 26"/>
+          <p:cNvSpPr/>
+          <p:nvPr/>
+        </p:nvSpPr>
+        <p:spPr>
+          <a:xfrm>
+            <a:off x="195691" y="1886008"/>
+            <a:ext cx="4824000" cy="321793"/>
+          </a:xfrm>
+          <a:prstGeom prst="roundRect">
+            <a:avLst>
+              <a:gd name="adj" fmla="val 9190"/>
+            </a:avLst>
+          </a:prstGeom>
+          <a:ln/>
+        </p:spPr>
+        <p:style>
+          <a:lnRef idx="2">
+            <a:schemeClr val="accent6">
+              <a:shade val="50000"/>
+            </a:schemeClr>
+          </a:lnRef>
+          <a:fillRef idx="1">
+            <a:schemeClr val="accent6"/>
+          </a:fillRef>
+          <a:effectRef idx="0">
+            <a:schemeClr val="accent6"/>
+          </a:effectRef>
+          <a:fontRef idx="minor">
+            <a:schemeClr val="lt1"/>
+          </a:fontRef>
+        </p:style>
+        <p:txBody>
+          <a:bodyPr rot="0" spcFirstLastPara="0" vertOverflow="overflow" horzOverflow="overflow" vert="horz" wrap="square" lIns="91440" tIns="45720" rIns="91440" bIns="45720" numCol="1" spcCol="0" rtlCol="0" fromWordArt="0" anchor="ctr" anchorCtr="0" forceAA="0" compatLnSpc="1">
+            <a:prstTxWarp prst="textNoShape">
+              <a:avLst/>
+            </a:prstTxWarp>
+            <a:noAutofit/>
+          </a:bodyPr>
+          <a:lstStyle/>
+          <a:p>
+            <a:pPr algn="ctr"/>
+            <a:r>
+              <a:rPr lang="en-SG" sz="1400" b="1" dirty="0">
+                <a:solidFill>
+                  <a:schemeClr val="tx1"/>
+                </a:solidFill>
+                <a:latin typeface="Consolas" pitchFamily="49" charset="0"/>
+                <a:cs typeface="Consolas" pitchFamily="49" charset="0"/>
+              </a:rPr>
+              <a:t>Angular, </a:t>
+            </a:r>
+            <a:r>
+              <a:rPr lang="en-SG" sz="1400" b="1" dirty="0" err="1">
+                <a:solidFill>
+                  <a:schemeClr val="tx1"/>
+                </a:solidFill>
+                <a:latin typeface="Consolas" pitchFamily="49" charset="0"/>
+                <a:cs typeface="Consolas" pitchFamily="49" charset="0"/>
+              </a:rPr>
+              <a:t>TypeScript</a:t>
             </a:r>
             <a:endParaRPr lang="en-SG" sz="1400" b="1" dirty="0">
               <a:solidFill>
-                <a:schemeClr val="bg1"/>
+                <a:schemeClr val="tx1"/>
               </a:solidFill>
               <a:latin typeface="Consolas" pitchFamily="49" charset="0"/>
               <a:cs typeface="Consolas" pitchFamily="49" charset="0"/>

</xml_diff>